<commit_message>
Revert "Revert "-Presentazione aggiornata""
This reverts commit 38a575349131d9843fcded02f937d2e321df0e90.
</commit_message>
<xml_diff>
--- a/Presentazione_Gioco15.pptx
+++ b/Presentazione_Gioco15.pptx
@@ -30,100 +30,100 @@
     <a:lvl1pPr algn="ctr" defTabSz="584200">
       <a:defRPr sz="3800">
         <a:solidFill>
-          <a:srgbClr val="FF0000"/>
+          <a:srgbClr val="FFFFFF"/>
         </a:solidFill>
-        <a:latin typeface="Helvetica Light"/>
-        <a:ea typeface="Helvetica Light"/>
-        <a:cs typeface="Helvetica Light"/>
-        <a:sym typeface="Helvetica Light"/>
+        <a:latin typeface="+mj-lt"/>
+        <a:ea typeface="+mj-ea"/>
+        <a:cs typeface="+mj-cs"/>
+        <a:sym typeface="Helvetica"/>
       </a:defRPr>
     </a:lvl1pPr>
     <a:lvl2pPr algn="ctr" defTabSz="584200">
       <a:defRPr sz="3800">
         <a:solidFill>
-          <a:srgbClr val="FF0000"/>
+          <a:srgbClr val="FFFFFF"/>
         </a:solidFill>
-        <a:latin typeface="Helvetica Light"/>
-        <a:ea typeface="Helvetica Light"/>
-        <a:cs typeface="Helvetica Light"/>
-        <a:sym typeface="Helvetica Light"/>
+        <a:latin typeface="+mj-lt"/>
+        <a:ea typeface="+mj-ea"/>
+        <a:cs typeface="+mj-cs"/>
+        <a:sym typeface="Helvetica"/>
       </a:defRPr>
     </a:lvl2pPr>
     <a:lvl3pPr algn="ctr" defTabSz="584200">
       <a:defRPr sz="3800">
         <a:solidFill>
-          <a:srgbClr val="FF0000"/>
+          <a:srgbClr val="FFFFFF"/>
         </a:solidFill>
-        <a:latin typeface="Helvetica Light"/>
-        <a:ea typeface="Helvetica Light"/>
-        <a:cs typeface="Helvetica Light"/>
-        <a:sym typeface="Helvetica Light"/>
+        <a:latin typeface="+mj-lt"/>
+        <a:ea typeface="+mj-ea"/>
+        <a:cs typeface="+mj-cs"/>
+        <a:sym typeface="Helvetica"/>
       </a:defRPr>
     </a:lvl3pPr>
     <a:lvl4pPr algn="ctr" defTabSz="584200">
       <a:defRPr sz="3800">
         <a:solidFill>
-          <a:srgbClr val="FF0000"/>
+          <a:srgbClr val="FFFFFF"/>
         </a:solidFill>
-        <a:latin typeface="Helvetica Light"/>
-        <a:ea typeface="Helvetica Light"/>
-        <a:cs typeface="Helvetica Light"/>
-        <a:sym typeface="Helvetica Light"/>
+        <a:latin typeface="+mj-lt"/>
+        <a:ea typeface="+mj-ea"/>
+        <a:cs typeface="+mj-cs"/>
+        <a:sym typeface="Helvetica"/>
       </a:defRPr>
     </a:lvl4pPr>
     <a:lvl5pPr algn="ctr" defTabSz="584200">
       <a:defRPr sz="3800">
         <a:solidFill>
-          <a:srgbClr val="FF0000"/>
+          <a:srgbClr val="FFFFFF"/>
         </a:solidFill>
-        <a:latin typeface="Helvetica Light"/>
-        <a:ea typeface="Helvetica Light"/>
-        <a:cs typeface="Helvetica Light"/>
-        <a:sym typeface="Helvetica Light"/>
+        <a:latin typeface="+mj-lt"/>
+        <a:ea typeface="+mj-ea"/>
+        <a:cs typeface="+mj-cs"/>
+        <a:sym typeface="Helvetica"/>
       </a:defRPr>
     </a:lvl5pPr>
     <a:lvl6pPr algn="ctr" defTabSz="584200">
       <a:defRPr sz="3800">
         <a:solidFill>
-          <a:srgbClr val="FF0000"/>
+          <a:srgbClr val="FFFFFF"/>
         </a:solidFill>
-        <a:latin typeface="Helvetica Light"/>
-        <a:ea typeface="Helvetica Light"/>
-        <a:cs typeface="Helvetica Light"/>
-        <a:sym typeface="Helvetica Light"/>
+        <a:latin typeface="+mj-lt"/>
+        <a:ea typeface="+mj-ea"/>
+        <a:cs typeface="+mj-cs"/>
+        <a:sym typeface="Helvetica"/>
       </a:defRPr>
     </a:lvl6pPr>
     <a:lvl7pPr algn="ctr" defTabSz="584200">
       <a:defRPr sz="3800">
         <a:solidFill>
-          <a:srgbClr val="FF0000"/>
+          <a:srgbClr val="FFFFFF"/>
         </a:solidFill>
-        <a:latin typeface="Helvetica Light"/>
-        <a:ea typeface="Helvetica Light"/>
-        <a:cs typeface="Helvetica Light"/>
-        <a:sym typeface="Helvetica Light"/>
+        <a:latin typeface="+mj-lt"/>
+        <a:ea typeface="+mj-ea"/>
+        <a:cs typeface="+mj-cs"/>
+        <a:sym typeface="Helvetica"/>
       </a:defRPr>
     </a:lvl7pPr>
     <a:lvl8pPr algn="ctr" defTabSz="584200">
       <a:defRPr sz="3800">
         <a:solidFill>
-          <a:srgbClr val="FF0000"/>
+          <a:srgbClr val="FFFFFF"/>
         </a:solidFill>
-        <a:latin typeface="Helvetica Light"/>
-        <a:ea typeface="Helvetica Light"/>
-        <a:cs typeface="Helvetica Light"/>
-        <a:sym typeface="Helvetica Light"/>
+        <a:latin typeface="+mj-lt"/>
+        <a:ea typeface="+mj-ea"/>
+        <a:cs typeface="+mj-cs"/>
+        <a:sym typeface="Helvetica"/>
       </a:defRPr>
     </a:lvl8pPr>
     <a:lvl9pPr algn="ctr" defTabSz="584200">
       <a:defRPr sz="3800">
         <a:solidFill>
-          <a:srgbClr val="FF0000"/>
+          <a:srgbClr val="FFFFFF"/>
         </a:solidFill>
-        <a:latin typeface="Helvetica Light"/>
-        <a:ea typeface="Helvetica Light"/>
-        <a:cs typeface="Helvetica Light"/>
-        <a:sym typeface="Helvetica Light"/>
+        <a:latin typeface="+mj-lt"/>
+        <a:ea typeface="+mj-ea"/>
+        <a:cs typeface="+mj-cs"/>
+        <a:sym typeface="Helvetica"/>
       </a:defRPr>
     </a:lvl9pPr>
   </p:defaultTextStyle>
@@ -210,9 +210,9 @@
         <a:spcPct val="117999"/>
       </a:lnSpc>
       <a:defRPr sz="2200">
-        <a:latin typeface="+mj-lt"/>
-        <a:ea typeface="+mj-ea"/>
-        <a:cs typeface="+mj-cs"/>
+        <a:latin typeface="+mn-lt"/>
+        <a:ea typeface="+mn-ea"/>
+        <a:cs typeface="+mn-cs"/>
         <a:sym typeface="Helvetica Neue"/>
       </a:defRPr>
     </a:lvl1pPr>
@@ -221,9 +221,9 @@
         <a:spcPct val="117999"/>
       </a:lnSpc>
       <a:defRPr sz="2200">
-        <a:latin typeface="+mj-lt"/>
-        <a:ea typeface="+mj-ea"/>
-        <a:cs typeface="+mj-cs"/>
+        <a:latin typeface="+mn-lt"/>
+        <a:ea typeface="+mn-ea"/>
+        <a:cs typeface="+mn-cs"/>
         <a:sym typeface="Helvetica Neue"/>
       </a:defRPr>
     </a:lvl2pPr>
@@ -232,9 +232,9 @@
         <a:spcPct val="117999"/>
       </a:lnSpc>
       <a:defRPr sz="2200">
-        <a:latin typeface="+mj-lt"/>
-        <a:ea typeface="+mj-ea"/>
-        <a:cs typeface="+mj-cs"/>
+        <a:latin typeface="+mn-lt"/>
+        <a:ea typeface="+mn-ea"/>
+        <a:cs typeface="+mn-cs"/>
         <a:sym typeface="Helvetica Neue"/>
       </a:defRPr>
     </a:lvl3pPr>
@@ -243,9 +243,9 @@
         <a:spcPct val="117999"/>
       </a:lnSpc>
       <a:defRPr sz="2200">
-        <a:latin typeface="+mj-lt"/>
-        <a:ea typeface="+mj-ea"/>
-        <a:cs typeface="+mj-cs"/>
+        <a:latin typeface="+mn-lt"/>
+        <a:ea typeface="+mn-ea"/>
+        <a:cs typeface="+mn-cs"/>
         <a:sym typeface="Helvetica Neue"/>
       </a:defRPr>
     </a:lvl4pPr>
@@ -254,9 +254,9 @@
         <a:spcPct val="117999"/>
       </a:lnSpc>
       <a:defRPr sz="2200">
-        <a:latin typeface="+mj-lt"/>
-        <a:ea typeface="+mj-ea"/>
-        <a:cs typeface="+mj-cs"/>
+        <a:latin typeface="+mn-lt"/>
+        <a:ea typeface="+mn-ea"/>
+        <a:cs typeface="+mn-cs"/>
         <a:sym typeface="Helvetica Neue"/>
       </a:defRPr>
     </a:lvl5pPr>
@@ -265,9 +265,9 @@
         <a:spcPct val="117999"/>
       </a:lnSpc>
       <a:defRPr sz="2200">
-        <a:latin typeface="+mj-lt"/>
-        <a:ea typeface="+mj-ea"/>
-        <a:cs typeface="+mj-cs"/>
+        <a:latin typeface="+mn-lt"/>
+        <a:ea typeface="+mn-ea"/>
+        <a:cs typeface="+mn-cs"/>
         <a:sym typeface="Helvetica Neue"/>
       </a:defRPr>
     </a:lvl6pPr>
@@ -276,9 +276,9 @@
         <a:spcPct val="117999"/>
       </a:lnSpc>
       <a:defRPr sz="2200">
-        <a:latin typeface="+mj-lt"/>
-        <a:ea typeface="+mj-ea"/>
-        <a:cs typeface="+mj-cs"/>
+        <a:latin typeface="+mn-lt"/>
+        <a:ea typeface="+mn-ea"/>
+        <a:cs typeface="+mn-cs"/>
         <a:sym typeface="Helvetica Neue"/>
       </a:defRPr>
     </a:lvl7pPr>
@@ -287,9 +287,9 @@
         <a:spcPct val="117999"/>
       </a:lnSpc>
       <a:defRPr sz="2200">
-        <a:latin typeface="+mj-lt"/>
-        <a:ea typeface="+mj-ea"/>
-        <a:cs typeface="+mj-cs"/>
+        <a:latin typeface="+mn-lt"/>
+        <a:ea typeface="+mn-ea"/>
+        <a:cs typeface="+mn-cs"/>
         <a:sym typeface="Helvetica Neue"/>
       </a:defRPr>
     </a:lvl8pPr>
@@ -298,9 +298,9 @@
         <a:spcPct val="117999"/>
       </a:lnSpc>
       <a:defRPr sz="2200">
-        <a:latin typeface="+mj-lt"/>
-        <a:ea typeface="+mj-ea"/>
-        <a:cs typeface="+mj-cs"/>
+        <a:latin typeface="+mn-lt"/>
+        <a:ea typeface="+mn-ea"/>
+        <a:cs typeface="+mn-cs"/>
         <a:sym typeface="Helvetica Neue"/>
       </a:defRPr>
     </a:lvl9pPr>
@@ -375,7 +375,7 @@
         <p:spPr>
           <a:xfrm>
             <a:off x="1270000" y="5029200"/>
-            <a:ext cx="10464800" cy="3568700"/>
+            <a:ext cx="10464800" cy="4724400"/>
           </a:xfrm>
           <a:prstGeom prst="rect">
             <a:avLst/>
@@ -646,8 +646,8 @@
         </p:nvSpPr>
         <p:spPr>
           <a:xfrm>
-            <a:off x="1270000" y="4279900"/>
-            <a:ext cx="10464800" cy="3860800"/>
+            <a:off x="1270000" y="1841500"/>
+            <a:ext cx="10464800" cy="6299200"/>
           </a:xfrm>
           <a:prstGeom prst="rect">
             <a:avLst/>
@@ -1181,8 +1181,8 @@
         </p:nvSpPr>
         <p:spPr>
           <a:xfrm>
-            <a:off x="952500" y="44612"/>
-            <a:ext cx="11099800" cy="2844476"/>
+            <a:off x="952500" y="7447"/>
+            <a:ext cx="11099800" cy="2918806"/>
           </a:xfrm>
           <a:prstGeom prst="rect">
             <a:avLst/>
@@ -1286,7 +1286,33 @@
         </p:spPr>
         <p:txBody>
           <a:bodyPr/>
-          <a:lstStyle/>
+          <a:lstStyle>
+            <a:lvl1pPr>
+              <a:buBlip>
+                <a:blip r:embed="rId2"/>
+              </a:buBlip>
+            </a:lvl1pPr>
+            <a:lvl2pPr>
+              <a:buBlip>
+                <a:blip r:embed="rId2"/>
+              </a:buBlip>
+            </a:lvl2pPr>
+            <a:lvl3pPr>
+              <a:buBlip>
+                <a:blip r:embed="rId2"/>
+              </a:buBlip>
+            </a:lvl3pPr>
+            <a:lvl4pPr>
+              <a:buBlip>
+                <a:blip r:embed="rId2"/>
+              </a:buBlip>
+            </a:lvl4pPr>
+            <a:lvl5pPr>
+              <a:buBlip>
+                <a:blip r:embed="rId2"/>
+              </a:buBlip>
+            </a:lvl5pPr>
+          </a:lstStyle>
           <a:p>
             <a:pPr lvl="0">
               <a:defRPr sz="1800">
@@ -1465,8 +1491,8 @@
         </p:nvSpPr>
         <p:spPr>
           <a:xfrm>
-            <a:off x="952500" y="2547418"/>
-            <a:ext cx="5334000" cy="6373264"/>
+            <a:off x="952500" y="2547417"/>
+            <a:ext cx="5334000" cy="6373266"/>
           </a:xfrm>
           <a:prstGeom prst="rect">
             <a:avLst/>
@@ -1479,30 +1505,45 @@
               <a:spcBef>
                 <a:spcPts val="3800"/>
               </a:spcBef>
+              <a:buBlip>
+                <a:blip r:embed="rId2"/>
+              </a:buBlip>
               <a:defRPr sz="2800"/>
             </a:lvl1pPr>
             <a:lvl2pPr marL="762000" indent="-381000">
               <a:spcBef>
                 <a:spcPts val="3800"/>
               </a:spcBef>
+              <a:buBlip>
+                <a:blip r:embed="rId2"/>
+              </a:buBlip>
               <a:defRPr sz="2800"/>
             </a:lvl2pPr>
             <a:lvl3pPr marL="1143000" indent="-381000">
               <a:spcBef>
                 <a:spcPts val="3800"/>
               </a:spcBef>
+              <a:buBlip>
+                <a:blip r:embed="rId2"/>
+              </a:buBlip>
               <a:defRPr sz="2800"/>
             </a:lvl3pPr>
             <a:lvl4pPr marL="1524000" indent="-381000">
               <a:spcBef>
                 <a:spcPts val="3800"/>
               </a:spcBef>
+              <a:buBlip>
+                <a:blip r:embed="rId2"/>
+              </a:buBlip>
               <a:defRPr sz="2800"/>
             </a:lvl4pPr>
             <a:lvl5pPr marL="1905000" indent="-381000">
               <a:spcBef>
                 <a:spcPts val="3800"/>
               </a:spcBef>
+              <a:buBlip>
+                <a:blip r:embed="rId2"/>
+              </a:buBlip>
               <a:defRPr sz="2800"/>
             </a:lvl5pPr>
           </a:lstStyle>
@@ -1658,7 +1699,33 @@
         </p:spPr>
         <p:txBody>
           <a:bodyPr/>
-          <a:lstStyle/>
+          <a:lstStyle>
+            <a:lvl1pPr>
+              <a:buBlip>
+                <a:blip r:embed="rId2"/>
+              </a:buBlip>
+            </a:lvl1pPr>
+            <a:lvl2pPr>
+              <a:buBlip>
+                <a:blip r:embed="rId2"/>
+              </a:buBlip>
+            </a:lvl2pPr>
+            <a:lvl3pPr>
+              <a:buBlip>
+                <a:blip r:embed="rId2"/>
+              </a:buBlip>
+            </a:lvl3pPr>
+            <a:lvl4pPr>
+              <a:buBlip>
+                <a:blip r:embed="rId2"/>
+              </a:buBlip>
+            </a:lvl4pPr>
+            <a:lvl5pPr>
+              <a:buBlip>
+                <a:blip r:embed="rId2"/>
+              </a:buBlip>
+            </a:lvl5pPr>
+          </a:lstStyle>
           <a:p>
             <a:pPr lvl="0">
               <a:defRPr sz="1800">
@@ -1840,7 +1907,7 @@
         <p:spPr>
           <a:xfrm>
             <a:off x="952500" y="386281"/>
-            <a:ext cx="11099800" cy="2161138"/>
+            <a:ext cx="11099800" cy="2161139"/>
           </a:xfrm>
           <a:prstGeom prst="rect">
             <a:avLst/>
@@ -1888,8 +1955,8 @@
         </p:nvSpPr>
         <p:spPr>
           <a:xfrm>
-            <a:off x="952500" y="2547418"/>
-            <a:ext cx="11099800" cy="6373264"/>
+            <a:off x="952500" y="2547417"/>
+            <a:ext cx="11099800" cy="6373266"/>
           </a:xfrm>
           <a:prstGeom prst="rect">
             <a:avLst/>
@@ -1907,7 +1974,33 @@
           <a:bodyPr lIns="0" tIns="0" rIns="0" bIns="0" anchor="ctr">
             <a:normAutofit fontScale="100000" lnSpcReduction="0"/>
           </a:bodyPr>
-          <a:lstStyle/>
+          <a:lstStyle>
+            <a:lvl1pPr>
+              <a:buBlip>
+                <a:blip r:embed="rId3"/>
+              </a:buBlip>
+            </a:lvl1pPr>
+            <a:lvl2pPr>
+              <a:buBlip>
+                <a:blip r:embed="rId3"/>
+              </a:buBlip>
+            </a:lvl2pPr>
+            <a:lvl3pPr>
+              <a:buBlip>
+                <a:blip r:embed="rId3"/>
+              </a:buBlip>
+            </a:lvl3pPr>
+            <a:lvl4pPr>
+              <a:buBlip>
+                <a:blip r:embed="rId3"/>
+              </a:buBlip>
+            </a:lvl4pPr>
+            <a:lvl5pPr>
+              <a:buBlip>
+                <a:blip r:embed="rId3"/>
+              </a:buBlip>
+            </a:lvl5pPr>
+          </a:lstStyle>
           <a:p>
             <a:pPr lvl="0">
               <a:defRPr sz="1800">
@@ -2019,18 +2112,18 @@
   </p:cSld>
   <p:clrMap bg1="dk1" tx1="lt1" bg2="dk2" tx2="lt2" accent1="accent1" accent2="accent2" accent3="accent3" accent4="accent4" accent5="accent5" accent6="accent6" hlink="hlink" folHlink="folHlink"/>
   <p:sldLayoutIdLst>
-    <p:sldLayoutId id="2147483649" r:id="rId3"/>
-    <p:sldLayoutId id="2147483650" r:id="rId4"/>
-    <p:sldLayoutId id="2147483651" r:id="rId5"/>
-    <p:sldLayoutId id="2147483652" r:id="rId6"/>
-    <p:sldLayoutId id="2147483653" r:id="rId7"/>
-    <p:sldLayoutId id="2147483654" r:id="rId8"/>
-    <p:sldLayoutId id="2147483655" r:id="rId9"/>
-    <p:sldLayoutId id="2147483656" r:id="rId10"/>
-    <p:sldLayoutId id="2147483657" r:id="rId11"/>
-    <p:sldLayoutId id="2147483658" r:id="rId12"/>
-    <p:sldLayoutId id="2147483659" r:id="rId13"/>
-    <p:sldLayoutId id="2147483660" r:id="rId14"/>
+    <p:sldLayoutId id="2147483649" r:id="rId4"/>
+    <p:sldLayoutId id="2147483650" r:id="rId5"/>
+    <p:sldLayoutId id="2147483651" r:id="rId6"/>
+    <p:sldLayoutId id="2147483652" r:id="rId7"/>
+    <p:sldLayoutId id="2147483653" r:id="rId8"/>
+    <p:sldLayoutId id="2147483654" r:id="rId9"/>
+    <p:sldLayoutId id="2147483655" r:id="rId10"/>
+    <p:sldLayoutId id="2147483656" r:id="rId11"/>
+    <p:sldLayoutId id="2147483657" r:id="rId12"/>
+    <p:sldLayoutId id="2147483658" r:id="rId13"/>
+    <p:sldLayoutId id="2147483659" r:id="rId14"/>
+    <p:sldLayoutId id="2147483660" r:id="rId15"/>
   </p:sldLayoutIdLst>
   <p:transition spd="med" advClick="1"/>
   <p:txStyles>
@@ -2141,7 +2234,9 @@
           <a:spcPts val="4200"/>
         </a:spcBef>
         <a:buSzPct val="75000"/>
-        <a:buChar char="•"/>
+        <a:buBlip>
+          <a:blip r:embed="rId3"/>
+        </a:buBlip>
         <a:defRPr sz="3800">
           <a:solidFill>
             <a:srgbClr val="FFFFFF"/>
@@ -2157,7 +2252,9 @@
           <a:spcPts val="4200"/>
         </a:spcBef>
         <a:buSzPct val="75000"/>
-        <a:buChar char="•"/>
+        <a:buBlip>
+          <a:blip r:embed="rId3"/>
+        </a:buBlip>
         <a:defRPr sz="3800">
           <a:solidFill>
             <a:srgbClr val="FFFFFF"/>
@@ -2173,7 +2270,9 @@
           <a:spcPts val="4200"/>
         </a:spcBef>
         <a:buSzPct val="75000"/>
-        <a:buChar char="•"/>
+        <a:buBlip>
+          <a:blip r:embed="rId3"/>
+        </a:buBlip>
         <a:defRPr sz="3800">
           <a:solidFill>
             <a:srgbClr val="FFFFFF"/>
@@ -2189,7 +2288,9 @@
           <a:spcPts val="4200"/>
         </a:spcBef>
         <a:buSzPct val="75000"/>
-        <a:buChar char="•"/>
+        <a:buBlip>
+          <a:blip r:embed="rId3"/>
+        </a:buBlip>
         <a:defRPr sz="3800">
           <a:solidFill>
             <a:srgbClr val="FFFFFF"/>
@@ -2205,7 +2306,9 @@
           <a:spcPts val="4200"/>
         </a:spcBef>
         <a:buSzPct val="75000"/>
-        <a:buChar char="•"/>
+        <a:buBlip>
+          <a:blip r:embed="rId3"/>
+        </a:buBlip>
         <a:defRPr sz="3800">
           <a:solidFill>
             <a:srgbClr val="FFFFFF"/>
@@ -2221,7 +2324,9 @@
           <a:spcPts val="4200"/>
         </a:spcBef>
         <a:buSzPct val="75000"/>
-        <a:buChar char="•"/>
+        <a:buBlip>
+          <a:blip r:embed="rId3"/>
+        </a:buBlip>
         <a:defRPr sz="3800">
           <a:solidFill>
             <a:srgbClr val="FFFFFF"/>
@@ -2237,7 +2342,9 @@
           <a:spcPts val="4200"/>
         </a:spcBef>
         <a:buSzPct val="75000"/>
-        <a:buChar char="•"/>
+        <a:buBlip>
+          <a:blip r:embed="rId3"/>
+        </a:buBlip>
         <a:defRPr sz="3800">
           <a:solidFill>
             <a:srgbClr val="FFFFFF"/>
@@ -2253,7 +2360,9 @@
           <a:spcPts val="4200"/>
         </a:spcBef>
         <a:buSzPct val="75000"/>
-        <a:buChar char="•"/>
+        <a:buBlip>
+          <a:blip r:embed="rId3"/>
+        </a:buBlip>
         <a:defRPr sz="3800">
           <a:solidFill>
             <a:srgbClr val="FFFFFF"/>
@@ -2269,7 +2378,9 @@
           <a:spcPts val="4200"/>
         </a:spcBef>
         <a:buSzPct val="75000"/>
-        <a:buChar char="•"/>
+        <a:buBlip>
+          <a:blip r:embed="rId3"/>
+        </a:buBlip>
         <a:defRPr sz="3800">
           <a:solidFill>
             <a:srgbClr val="FFFFFF"/>
@@ -2437,7 +2548,7 @@
                   <a:srgbClr val="FFFFFF"/>
                 </a:solidFill>
               </a:rPr>
-              <a:t>Gioco del 15 (abbozzo)</a:t>
+              <a:t>Gioco del 15</a:t>
             </a:r>
           </a:p>
         </p:txBody>
@@ -2476,7 +2587,23 @@
                   <a:srgbClr val="FFFFFF"/>
                 </a:solidFill>
               </a:rPr>
-              <a:t>Gruppo:Genta, Massimino, Levrone, Nikolov.</a:t>
+              <a:t>Gruppo:Genta, Massimino, Levrone</a:t>
+            </a:r>
+            <a:r>
+              <a:rPr sz="3200">
+                <a:solidFill>
+                  <a:srgbClr val="FFFFFF"/>
+                </a:solidFill>
+              </a:rPr>
+              <a:t> e</a:t>
+            </a:r>
+            <a:r>
+              <a:rPr sz="3200">
+                <a:solidFill>
+                  <a:srgbClr val="FFFFFF"/>
+                </a:solidFill>
+              </a:rPr>
+              <a:t> Nikolov.</a:t>
             </a:r>
           </a:p>
         </p:txBody>
@@ -2621,150 +2748,14 @@
       </p:par>
     </p:tnLst>
     <p:bldLst>
+      <p:bldP build="whole" bldLvl="1" animBg="1" rev="0" advAuto="0" spid="33" grpId="2"/>
       <p:bldP build="whole" bldLvl="1" animBg="1" rev="0" advAuto="0" spid="32" grpId="1"/>
-      <p:bldP build="whole" bldLvl="1" animBg="1" rev="0" advAuto="0" spid="33" grpId="2"/>
     </p:bldLst>
   </p:timing>
 </p:sld>
 </file>
 
 <file path=ppt/slides/slide10.xml><?xml version="1.0" encoding="utf-8"?>
-<p:sld xmlns:a="http://schemas.openxmlformats.org/drawingml/2006/main" xmlns:r="http://schemas.openxmlformats.org/officeDocument/2006/relationships" xmlns:p="http://schemas.openxmlformats.org/presentationml/2006/main" showMasterSp="1" showMasterPhAnim="1">
-  <p:cSld>
-    <p:spTree>
-      <p:nvGrpSpPr>
-        <p:cNvPr id="1" name=""/>
-        <p:cNvGrpSpPr/>
-        <p:nvPr/>
-      </p:nvGrpSpPr>
-      <p:grpSpPr>
-        <a:xfrm>
-          <a:off x="0" y="0"/>
-          <a:ext cx="0" cy="0"/>
-          <a:chOff x="0" y="0"/>
-          <a:chExt cx="0" cy="0"/>
-        </a:xfrm>
-      </p:grpSpPr>
-      <p:sp>
-        <p:nvSpPr>
-          <p:cNvPr id="56" name="Shape 56"/>
-          <p:cNvSpPr/>
-          <p:nvPr>
-            <p:ph type="title"/>
-          </p:nvPr>
-        </p:nvSpPr>
-        <p:spPr>
-          <a:xfrm>
-            <a:off x="952500" y="406400"/>
-            <a:ext cx="11099800" cy="2120900"/>
-          </a:xfrm>
-          <a:prstGeom prst="rect">
-            <a:avLst/>
-          </a:prstGeom>
-        </p:spPr>
-        <p:txBody>
-          <a:bodyPr/>
-          <a:lstStyle>
-            <a:lvl1pPr defTabSz="531622">
-              <a:defRPr sz="7200"/>
-            </a:lvl1pPr>
-          </a:lstStyle>
-          <a:p>
-            <a:pPr lvl="0">
-              <a:defRPr sz="1800">
-                <a:solidFill>
-                  <a:srgbClr val="000000"/>
-                </a:solidFill>
-              </a:defRPr>
-            </a:pPr>
-            <a:r>
-              <a:rPr sz="7200">
-                <a:solidFill>
-                  <a:srgbClr val="FFFFFF"/>
-                </a:solidFill>
-              </a:rPr>
-              <a:t>Animazione vittoria e inizio</a:t>
-            </a:r>
-          </a:p>
-        </p:txBody>
-      </p:sp>
-      <p:sp>
-        <p:nvSpPr>
-          <p:cNvPr id="57" name="Shape 57"/>
-          <p:cNvSpPr/>
-          <p:nvPr>
-            <p:ph type="body" idx="1"/>
-          </p:nvPr>
-        </p:nvSpPr>
-        <p:spPr>
-          <a:xfrm>
-            <a:off x="952500" y="2590800"/>
-            <a:ext cx="11099800" cy="6286500"/>
-          </a:xfrm>
-          <a:prstGeom prst="rect">
-            <a:avLst/>
-          </a:prstGeom>
-        </p:spPr>
-        <p:txBody>
-          <a:bodyPr/>
-          <a:lstStyle/>
-          <a:p>
-            <a:pPr lvl="0" marL="965200" indent="-965200">
-              <a:buClr>
-                <a:srgbClr val="FFFFFF"/>
-              </a:buClr>
-              <a:defRPr sz="1800">
-                <a:solidFill>
-                  <a:srgbClr val="000000"/>
-                </a:solidFill>
-              </a:defRPr>
-            </a:pPr>
-            <a:r>
-              <a:rPr sz="3800">
-                <a:solidFill>
-                  <a:srgbClr val="FFFFFF"/>
-                </a:solidFill>
-              </a:rPr>
-              <a:t>Vittoria (id=testo celle)</a:t>
-            </a:r>
-            <a:endParaRPr sz="3800">
-              <a:solidFill>
-                <a:srgbClr val="FFFFFF"/>
-              </a:solidFill>
-            </a:endParaRPr>
-          </a:p>
-          <a:p>
-            <a:pPr lvl="0" marL="965200" indent="-965200">
-              <a:buClr>
-                <a:srgbClr val="FFFFFF"/>
-              </a:buClr>
-              <a:defRPr sz="1800">
-                <a:solidFill>
-                  <a:srgbClr val="000000"/>
-                </a:solidFill>
-              </a:defRPr>
-            </a:pPr>
-            <a:r>
-              <a:rPr sz="3800">
-                <a:solidFill>
-                  <a:srgbClr val="FFFFFF"/>
-                </a:solidFill>
-              </a:rPr>
-              <a:t>Animazione=rotazione di 360 gradi con cambio di testo in complimenti</a:t>
-            </a:r>
-          </a:p>
-        </p:txBody>
-      </p:sp>
-    </p:spTree>
-  </p:cSld>
-  <p:clrMapOvr>
-    <a:masterClrMapping/>
-  </p:clrMapOvr>
-  <p:transition spd="slow" advClick="1"/>
-</p:sld>
-</file>
-
-<file path=ppt/slides/slide11.xml><?xml version="1.0" encoding="utf-8"?>
 <p:sld xmlns:a="http://schemas.openxmlformats.org/drawingml/2006/main" xmlns:r="http://schemas.openxmlformats.org/officeDocument/2006/relationships" xmlns:p="http://schemas.openxmlformats.org/presentationml/2006/main" showMasterSp="1" showMasterPhAnim="1">
   <p:cSld>
     <p:spTree>
@@ -2800,7 +2791,11 @@
         </p:spPr>
         <p:txBody>
           <a:bodyPr/>
-          <a:lstStyle/>
+          <a:lstStyle>
+            <a:lvl1pPr defTabSz="531622">
+              <a:defRPr sz="7200"/>
+            </a:lvl1pPr>
+          </a:lstStyle>
           <a:p>
             <a:pPr lvl="0">
               <a:defRPr sz="1800">
@@ -2810,12 +2805,12 @@
               </a:defRPr>
             </a:pPr>
             <a:r>
-              <a:rPr sz="8000">
-                <a:solidFill>
-                  <a:srgbClr val="FFFFFF"/>
-                </a:solidFill>
-              </a:rPr>
-              <a:t>Test risolvibilità matrice</a:t>
+              <a:rPr sz="7200">
+                <a:solidFill>
+                  <a:srgbClr val="FFFFFF"/>
+                </a:solidFill>
+              </a:rPr>
+              <a:t>Animazione vittoria e inizio</a:t>
             </a:r>
           </a:p>
         </p:txBody>
@@ -2839,11 +2834,147 @@
         </p:spPr>
         <p:txBody>
           <a:bodyPr/>
-          <a:lstStyle>
-            <a:lvl1pPr marL="965200" indent="-965200">
+          <a:lstStyle/>
+          <a:p>
+            <a:pPr lvl="0" marL="2037644" indent="-2037644">
               <a:buClr>
                 <a:srgbClr val="FFFFFF"/>
               </a:buClr>
+              <a:buBlip>
+                <a:blip r:embed="rId2"/>
+              </a:buBlip>
+              <a:defRPr sz="1800">
+                <a:solidFill>
+                  <a:srgbClr val="000000"/>
+                </a:solidFill>
+              </a:defRPr>
+            </a:pPr>
+            <a:r>
+              <a:rPr sz="3800">
+                <a:solidFill>
+                  <a:srgbClr val="FFFFFF"/>
+                </a:solidFill>
+              </a:rPr>
+              <a:t>Vittoria (id=testo celle)</a:t>
+            </a:r>
+          </a:p>
+          <a:p>
+            <a:pPr lvl="0" marL="2037644" indent="-2037644">
+              <a:buClr>
+                <a:srgbClr val="FFFFFF"/>
+              </a:buClr>
+              <a:buBlip>
+                <a:blip r:embed="rId2"/>
+              </a:buBlip>
+              <a:defRPr sz="1800">
+                <a:solidFill>
+                  <a:srgbClr val="000000"/>
+                </a:solidFill>
+              </a:defRPr>
+            </a:pPr>
+            <a:r>
+              <a:rPr sz="3800">
+                <a:solidFill>
+                  <a:srgbClr val="FFFFFF"/>
+                </a:solidFill>
+              </a:rPr>
+              <a:t>Animazione=rotazione di 360 gradi con cambio di testo in complimenti</a:t>
+            </a:r>
+          </a:p>
+        </p:txBody>
+      </p:sp>
+    </p:spTree>
+  </p:cSld>
+  <p:clrMapOvr>
+    <a:masterClrMapping/>
+  </p:clrMapOvr>
+  <p:transition spd="med" advClick="1"/>
+</p:sld>
+</file>
+
+<file path=ppt/slides/slide11.xml><?xml version="1.0" encoding="utf-8"?>
+<p:sld xmlns:a="http://schemas.openxmlformats.org/drawingml/2006/main" xmlns:r="http://schemas.openxmlformats.org/officeDocument/2006/relationships" xmlns:p="http://schemas.openxmlformats.org/presentationml/2006/main" showMasterSp="1" showMasterPhAnim="1">
+  <p:cSld>
+    <p:spTree>
+      <p:nvGrpSpPr>
+        <p:cNvPr id="1" name=""/>
+        <p:cNvGrpSpPr/>
+        <p:nvPr/>
+      </p:nvGrpSpPr>
+      <p:grpSpPr>
+        <a:xfrm>
+          <a:off x="0" y="0"/>
+          <a:ext cx="0" cy="0"/>
+          <a:chOff x="0" y="0"/>
+          <a:chExt cx="0" cy="0"/>
+        </a:xfrm>
+      </p:grpSpPr>
+      <p:sp>
+        <p:nvSpPr>
+          <p:cNvPr id="62" name="Shape 62"/>
+          <p:cNvSpPr/>
+          <p:nvPr>
+            <p:ph type="title"/>
+          </p:nvPr>
+        </p:nvSpPr>
+        <p:spPr>
+          <a:xfrm>
+            <a:off x="952500" y="406400"/>
+            <a:ext cx="11099800" cy="2120900"/>
+          </a:xfrm>
+          <a:prstGeom prst="rect">
+            <a:avLst/>
+          </a:prstGeom>
+        </p:spPr>
+        <p:txBody>
+          <a:bodyPr/>
+          <a:lstStyle/>
+          <a:p>
+            <a:pPr lvl="0">
+              <a:defRPr sz="1800">
+                <a:solidFill>
+                  <a:srgbClr val="000000"/>
+                </a:solidFill>
+              </a:defRPr>
+            </a:pPr>
+            <a:r>
+              <a:rPr sz="8000">
+                <a:solidFill>
+                  <a:srgbClr val="FFFFFF"/>
+                </a:solidFill>
+              </a:rPr>
+              <a:t>Test risolvibilità matrice</a:t>
+            </a:r>
+          </a:p>
+        </p:txBody>
+      </p:sp>
+      <p:sp>
+        <p:nvSpPr>
+          <p:cNvPr id="63" name="Shape 63"/>
+          <p:cNvSpPr/>
+          <p:nvPr>
+            <p:ph type="body" idx="1"/>
+          </p:nvPr>
+        </p:nvSpPr>
+        <p:spPr>
+          <a:xfrm>
+            <a:off x="952500" y="2590800"/>
+            <a:ext cx="11099800" cy="6286500"/>
+          </a:xfrm>
+          <a:prstGeom prst="rect">
+            <a:avLst/>
+          </a:prstGeom>
+        </p:spPr>
+        <p:txBody>
+          <a:bodyPr/>
+          <a:lstStyle>
+            <a:lvl1pPr marL="2037644" indent="-2037644">
+              <a:buClr>
+                <a:srgbClr val="FFFFFF"/>
+              </a:buClr>
+              <a:buBlip>
+                <a:blip r:embed="rId2"/>
+              </a:buBlip>
             </a:lvl1pPr>
           </a:lstStyle>
           <a:p>
@@ -2893,7 +3024,7 @@
       </p:grpSpPr>
       <p:sp>
         <p:nvSpPr>
-          <p:cNvPr id="62" name="Shape 62"/>
+          <p:cNvPr id="65" name="Shape 65"/>
           <p:cNvSpPr/>
           <p:nvPr>
             <p:ph type="title"/>
@@ -2975,7 +3106,7 @@
                             </p:stCondLst>
                             <p:childTnLst>
                               <p:par>
-                                <p:cTn id="5" nodeType="clickEffect" presetClass="entr" presetSubtype="0" presetID="9" grpId="1" fill="hold">
+                                <p:cTn id="5" nodeType="clickEffect" presetClass="entr" presetSubtype="0" presetID="10" grpId="1" fill="hold">
                                   <p:stCondLst>
                                     <p:cond delay="0"/>
                                   </p:stCondLst>
@@ -2987,7 +3118,7 @@
                                       <p:cBhvr>
                                         <p:cTn id="6" fill="hold"/>
                                         <p:tgtEl>
-                                          <p:spTgt spid="62"/>
+                                          <p:spTgt spid="65"/>
                                         </p:tgtEl>
                                         <p:attrNameLst>
                                           <p:attrName>style.visibility</p:attrName>
@@ -2997,11 +3128,11 @@
                                         <p:strVal val="visible"/>
                                       </p:to>
                                     </p:set>
-                                    <p:animEffect filter="dissolve" transition="in">
+                                    <p:animEffect filter="fade" transition="in">
                                       <p:cBhvr>
                                         <p:cTn id="7" dur="1500"/>
                                         <p:tgtEl>
-                                          <p:spTgt spid="62"/>
+                                          <p:spTgt spid="65"/>
                                         </p:tgtEl>
                                       </p:cBhvr>
                                     </p:animEffect>
@@ -3036,145 +3167,13 @@
       </p:par>
     </p:tnLst>
     <p:bldLst>
-      <p:bldP build="whole" bldLvl="1" animBg="1" rev="0" advAuto="0" spid="62" grpId="1"/>
+      <p:bldP build="whole" bldLvl="1" animBg="1" rev="0" advAuto="0" spid="65" grpId="1"/>
     </p:bldLst>
   </p:timing>
 </p:sld>
 </file>
 
 <file path=ppt/slides/slide13.xml><?xml version="1.0" encoding="utf-8"?>
-<p:sld xmlns:a="http://schemas.openxmlformats.org/drawingml/2006/main" xmlns:r="http://schemas.openxmlformats.org/officeDocument/2006/relationships" xmlns:p="http://schemas.openxmlformats.org/presentationml/2006/main" showMasterSp="1" showMasterPhAnim="1">
-  <p:cSld>
-    <p:spTree>
-      <p:nvGrpSpPr>
-        <p:cNvPr id="1" name=""/>
-        <p:cNvGrpSpPr/>
-        <p:nvPr/>
-      </p:nvGrpSpPr>
-      <p:grpSpPr>
-        <a:xfrm>
-          <a:off x="0" y="0"/>
-          <a:ext cx="0" cy="0"/>
-          <a:chOff x="0" y="0"/>
-          <a:chExt cx="0" cy="0"/>
-        </a:xfrm>
-      </p:grpSpPr>
-      <p:sp>
-        <p:nvSpPr>
-          <p:cNvPr id="64" name="Shape 64"/>
-          <p:cNvSpPr/>
-          <p:nvPr>
-            <p:ph type="title"/>
-          </p:nvPr>
-        </p:nvSpPr>
-        <p:spPr>
-          <a:xfrm>
-            <a:off x="952500" y="406400"/>
-            <a:ext cx="11099800" cy="2120900"/>
-          </a:xfrm>
-          <a:prstGeom prst="rect">
-            <a:avLst/>
-          </a:prstGeom>
-        </p:spPr>
-        <p:txBody>
-          <a:bodyPr/>
-          <a:lstStyle/>
-          <a:p>
-            <a:pPr lvl="0">
-              <a:defRPr sz="1800">
-                <a:solidFill>
-                  <a:srgbClr val="000000"/>
-                </a:solidFill>
-              </a:defRPr>
-            </a:pPr>
-            <a:r>
-              <a:rPr sz="8000">
-                <a:solidFill>
-                  <a:srgbClr val="FFFFFF"/>
-                </a:solidFill>
-              </a:rPr>
-              <a:t>Lavoro di gruppo</a:t>
-            </a:r>
-          </a:p>
-        </p:txBody>
-      </p:sp>
-      <p:sp>
-        <p:nvSpPr>
-          <p:cNvPr id="65" name="Shape 65"/>
-          <p:cNvSpPr/>
-          <p:nvPr>
-            <p:ph type="body" idx="1"/>
-          </p:nvPr>
-        </p:nvSpPr>
-        <p:spPr>
-          <a:xfrm>
-            <a:off x="952500" y="2590800"/>
-            <a:ext cx="11099800" cy="6286500"/>
-          </a:xfrm>
-          <a:prstGeom prst="rect">
-            <a:avLst/>
-          </a:prstGeom>
-        </p:spPr>
-        <p:txBody>
-          <a:bodyPr/>
-          <a:lstStyle/>
-          <a:p>
-            <a:pPr lvl="0" marL="965200" indent="-965200">
-              <a:buClr>
-                <a:srgbClr val="FFFFFF"/>
-              </a:buClr>
-              <a:defRPr sz="1800">
-                <a:solidFill>
-                  <a:srgbClr val="000000"/>
-                </a:solidFill>
-              </a:defRPr>
-            </a:pPr>
-            <a:r>
-              <a:rPr sz="3800">
-                <a:solidFill>
-                  <a:srgbClr val="FFFFFF"/>
-                </a:solidFill>
-              </a:rPr>
-              <a:t>Per condividere, aggiornare e scambiare materiale abbiamo fatto affidamento su GitHub</a:t>
-            </a:r>
-            <a:endParaRPr sz="3800">
-              <a:solidFill>
-                <a:srgbClr val="FFFFFF"/>
-              </a:solidFill>
-            </a:endParaRPr>
-          </a:p>
-          <a:p>
-            <a:pPr lvl="0" marL="965200" indent="-965200">
-              <a:buClr>
-                <a:srgbClr val="FFFFFF"/>
-              </a:buClr>
-              <a:defRPr sz="1800">
-                <a:solidFill>
-                  <a:srgbClr val="000000"/>
-                </a:solidFill>
-              </a:defRPr>
-            </a:pPr>
-            <a:r>
-              <a:rPr sz="3800">
-                <a:solidFill>
-                  <a:srgbClr val="FFFFFF"/>
-                </a:solidFill>
-              </a:rPr>
-              <a:t>Abbiamo seguito una tabella di marcia realizzando prima il codice HTML poi gli script e infine gli stili CSS.</a:t>
-            </a:r>
-          </a:p>
-        </p:txBody>
-      </p:sp>
-    </p:spTree>
-  </p:cSld>
-  <p:clrMapOvr>
-    <a:masterClrMapping/>
-  </p:clrMapOvr>
-  <p:transition spd="slow" advClick="1"/>
-</p:sld>
-</file>
-
-<file path=ppt/slides/slide14.xml><?xml version="1.0" encoding="utf-8"?>
 <p:sld xmlns:a="http://schemas.openxmlformats.org/drawingml/2006/main" xmlns:r="http://schemas.openxmlformats.org/officeDocument/2006/relationships" xmlns:p="http://schemas.openxmlformats.org/presentationml/2006/main" showMasterSp="1" showMasterPhAnim="1">
   <p:cSld>
     <p:spTree>
@@ -3225,7 +3224,7 @@
                   <a:srgbClr val="FFFFFF"/>
                 </a:solidFill>
               </a:rPr>
-              <a:t>Ruoli nel gruppo</a:t>
+              <a:t>Lavoro di gruppo</a:t>
             </a:r>
           </a:p>
         </p:txBody>
@@ -3251,6 +3250,139 @@
           <a:bodyPr/>
           <a:lstStyle/>
           <a:p>
+            <a:pPr lvl="0" marL="2037644" indent="-2037644">
+              <a:buClr>
+                <a:srgbClr val="FFFFFF"/>
+              </a:buClr>
+              <a:buBlip>
+                <a:blip r:embed="rId2"/>
+              </a:buBlip>
+              <a:defRPr sz="1800">
+                <a:solidFill>
+                  <a:srgbClr val="000000"/>
+                </a:solidFill>
+              </a:defRPr>
+            </a:pPr>
+            <a:r>
+              <a:rPr sz="3800">
+                <a:solidFill>
+                  <a:srgbClr val="FFFFFF"/>
+                </a:solidFill>
+              </a:rPr>
+              <a:t>Per condividere, aggiornare e scambiare materiale abbiamo fatto affidamento su GitHub</a:t>
+            </a:r>
+          </a:p>
+          <a:p>
+            <a:pPr lvl="0" marL="2037644" indent="-2037644">
+              <a:buClr>
+                <a:srgbClr val="FFFFFF"/>
+              </a:buClr>
+              <a:buBlip>
+                <a:blip r:embed="rId2"/>
+              </a:buBlip>
+              <a:defRPr sz="1800">
+                <a:solidFill>
+                  <a:srgbClr val="000000"/>
+                </a:solidFill>
+              </a:defRPr>
+            </a:pPr>
+            <a:r>
+              <a:rPr sz="3800">
+                <a:solidFill>
+                  <a:srgbClr val="FFFFFF"/>
+                </a:solidFill>
+              </a:rPr>
+              <a:t>Abbiamo seguito una tabella di marcia realizzando prima il codice HTML poi gli script e infine gli stili CSS.</a:t>
+            </a:r>
+          </a:p>
+        </p:txBody>
+      </p:sp>
+    </p:spTree>
+  </p:cSld>
+  <p:clrMapOvr>
+    <a:masterClrMapping/>
+  </p:clrMapOvr>
+  <p:transition spd="med" advClick="1"/>
+</p:sld>
+</file>
+
+<file path=ppt/slides/slide14.xml><?xml version="1.0" encoding="utf-8"?>
+<p:sld xmlns:a="http://schemas.openxmlformats.org/drawingml/2006/main" xmlns:r="http://schemas.openxmlformats.org/officeDocument/2006/relationships" xmlns:p="http://schemas.openxmlformats.org/presentationml/2006/main" showMasterSp="1" showMasterPhAnim="1">
+  <p:cSld>
+    <p:spTree>
+      <p:nvGrpSpPr>
+        <p:cNvPr id="1" name=""/>
+        <p:cNvGrpSpPr/>
+        <p:nvPr/>
+      </p:nvGrpSpPr>
+      <p:grpSpPr>
+        <a:xfrm>
+          <a:off x="0" y="0"/>
+          <a:ext cx="0" cy="0"/>
+          <a:chOff x="0" y="0"/>
+          <a:chExt cx="0" cy="0"/>
+        </a:xfrm>
+      </p:grpSpPr>
+      <p:sp>
+        <p:nvSpPr>
+          <p:cNvPr id="70" name="Shape 70"/>
+          <p:cNvSpPr/>
+          <p:nvPr>
+            <p:ph type="title"/>
+          </p:nvPr>
+        </p:nvSpPr>
+        <p:spPr>
+          <a:xfrm>
+            <a:off x="952500" y="406400"/>
+            <a:ext cx="11099800" cy="2120900"/>
+          </a:xfrm>
+          <a:prstGeom prst="rect">
+            <a:avLst/>
+          </a:prstGeom>
+        </p:spPr>
+        <p:txBody>
+          <a:bodyPr/>
+          <a:lstStyle/>
+          <a:p>
+            <a:pPr lvl="0">
+              <a:defRPr sz="1800">
+                <a:solidFill>
+                  <a:srgbClr val="000000"/>
+                </a:solidFill>
+              </a:defRPr>
+            </a:pPr>
+            <a:r>
+              <a:rPr sz="8000">
+                <a:solidFill>
+                  <a:srgbClr val="FFFFFF"/>
+                </a:solidFill>
+              </a:rPr>
+              <a:t>Ruoli nel gruppo</a:t>
+            </a:r>
+          </a:p>
+        </p:txBody>
+      </p:sp>
+      <p:sp>
+        <p:nvSpPr>
+          <p:cNvPr id="71" name="Shape 71"/>
+          <p:cNvSpPr/>
+          <p:nvPr>
+            <p:ph type="body" idx="1"/>
+          </p:nvPr>
+        </p:nvSpPr>
+        <p:spPr>
+          <a:xfrm>
+            <a:off x="952500" y="2590800"/>
+            <a:ext cx="11099800" cy="6286500"/>
+          </a:xfrm>
+          <a:prstGeom prst="rect">
+            <a:avLst/>
+          </a:prstGeom>
+        </p:spPr>
+        <p:txBody>
+          <a:bodyPr/>
+          <a:lstStyle/>
+          <a:p>
             <a:pPr lvl="0" marL="0" indent="0">
               <a:buSzTx/>
               <a:buNone/>
@@ -3268,20 +3400,18 @@
               </a:rPr>
               <a:t>2 sotto-team</a:t>
             </a:r>
-            <a:endParaRPr sz="3800">
-              <a:solidFill>
-                <a:srgbClr val="FFFFFF"/>
-              </a:solidFill>
-            </a:endParaRPr>
-          </a:p>
-          <a:p>
-            <a:pPr lvl="1" marL="1422400" indent="-965200">
+          </a:p>
+          <a:p>
+            <a:pPr lvl="1" marL="2494844" indent="-2037644">
               <a:spcBef>
                 <a:spcPts val="600"/>
               </a:spcBef>
               <a:buClr>
                 <a:srgbClr val="FFFFFF"/>
               </a:buClr>
+              <a:buBlip>
+                <a:blip r:embed="rId2"/>
+              </a:buBlip>
               <a:defRPr sz="1800">
                 <a:solidFill>
                   <a:srgbClr val="000000"/>
@@ -3296,20 +3426,18 @@
               </a:rPr>
               <a:t>Genta e Massimino: sviluppo codice, implementazione grafica e documentazione.</a:t>
             </a:r>
-            <a:endParaRPr sz="3800">
-              <a:solidFill>
-                <a:srgbClr val="FFFFFF"/>
-              </a:solidFill>
-            </a:endParaRPr>
-          </a:p>
-          <a:p>
-            <a:pPr lvl="1" marL="1422400" indent="-965200">
+          </a:p>
+          <a:p>
+            <a:pPr lvl="1" marL="2494844" indent="-2037644">
               <a:spcBef>
                 <a:spcPts val="600"/>
               </a:spcBef>
               <a:buClr>
                 <a:srgbClr val="FFFFFF"/>
               </a:buClr>
+              <a:buBlip>
+                <a:blip r:embed="rId2"/>
+              </a:buBlip>
               <a:defRPr sz="1800">
                 <a:solidFill>
                   <a:srgbClr val="000000"/>
@@ -3355,7 +3483,7 @@
       </p:grpSpPr>
       <p:sp>
         <p:nvSpPr>
-          <p:cNvPr id="70" name="Shape 70"/>
+          <p:cNvPr id="73" name="Shape 73"/>
           <p:cNvSpPr/>
           <p:nvPr>
             <p:ph type="title"/>
@@ -3419,7 +3547,7 @@
                             </p:stCondLst>
                             <p:childTnLst>
                               <p:par>
-                                <p:cTn id="5" nodeType="clickEffect" presetClass="entr" presetSubtype="0" presetID="9" grpId="1" fill="hold">
+                                <p:cTn id="5" nodeType="clickEffect" presetClass="entr" presetSubtype="0" presetID="10" grpId="1" fill="hold">
                                   <p:stCondLst>
                                     <p:cond delay="0"/>
                                   </p:stCondLst>
@@ -3431,7 +3559,7 @@
                                       <p:cBhvr>
                                         <p:cTn id="6" fill="hold"/>
                                         <p:tgtEl>
-                                          <p:spTgt spid="70"/>
+                                          <p:spTgt spid="73"/>
                                         </p:tgtEl>
                                         <p:attrNameLst>
                                           <p:attrName>style.visibility</p:attrName>
@@ -3441,11 +3569,11 @@
                                         <p:strVal val="visible"/>
                                       </p:to>
                                     </p:set>
-                                    <p:animEffect filter="dissolve" transition="in">
+                                    <p:animEffect filter="fade" transition="in">
                                       <p:cBhvr>
                                         <p:cTn id="7" dur="1500"/>
                                         <p:tgtEl>
-                                          <p:spTgt spid="70"/>
+                                          <p:spTgt spid="73"/>
                                         </p:tgtEl>
                                       </p:cBhvr>
                                     </p:animEffect>
@@ -3480,7 +3608,7 @@
       </p:par>
     </p:tnLst>
     <p:bldLst>
-      <p:bldP build="whole" bldLvl="1" animBg="1" rev="0" advAuto="0" spid="70" grpId="1"/>
+      <p:bldP build="whole" bldLvl="1" animBg="1" rev="0" advAuto="0" spid="73" grpId="1"/>
     </p:bldLst>
   </p:timing>
 </p:sld>
@@ -3565,7 +3693,7 @@
   <p:clrMapOvr>
     <a:masterClrMapping/>
   </p:clrMapOvr>
-  <p:transition spd="slow" advClick="1"/>
+  <p:transition spd="med" advClick="1"/>
   <p:timing>
     <p:tnLst>
       <p:par>
@@ -3587,7 +3715,7 @@
                             </p:stCondLst>
                             <p:childTnLst>
                               <p:par>
-                                <p:cTn id="5" nodeType="clickEffect" presetClass="entr" presetSubtype="0" presetID="9" grpId="1" fill="hold">
+                                <p:cTn id="5" nodeType="clickEffect" presetClass="entr" presetSubtype="0" presetID="10" grpId="1" fill="hold">
                                   <p:stCondLst>
                                     <p:cond delay="0"/>
                                   </p:stCondLst>
@@ -3609,7 +3737,7 @@
                                         <p:strVal val="visible"/>
                                       </p:to>
                                     </p:set>
-                                    <p:animEffect filter="dissolve" transition="in">
+                                    <p:animEffect filter="fade" transition="in">
                                       <p:cBhvr>
                                         <p:cTn id="7" dur="1500"/>
                                         <p:tgtEl>
@@ -3731,23 +3859,28 @@
           <a:bodyPr/>
           <a:lstStyle/>
           <a:p>
-            <a:pPr lvl="0" marL="965200" indent="-965200">
-              <a:buClr>
-                <a:srgbClr val="FFFFFF"/>
-              </a:buClr>
-              <a:defRPr sz="1800">
-                <a:solidFill>
-                  <a:srgbClr val="000000"/>
-                </a:solidFill>
-              </a:defRPr>
-            </a:pPr>
+            <a:pPr lvl="0" marL="180473" indent="-180473">
+              <a:buSzPct val="60000"/>
+              <a:buBlip>
+                <a:blip r:embed="rId2"/>
+              </a:buBlip>
+              <a:defRPr sz="1800">
+                <a:solidFill>
+                  <a:srgbClr val="000000"/>
+                </a:solidFill>
+              </a:defRPr>
+            </a:pPr>
+            <a:r>
+              <a:rPr sz="3800"/>
+              <a:t> </a:t>
+            </a:r>
             <a:r>
               <a:rPr sz="3800">
                 <a:solidFill>
                   <a:srgbClr val="FFFFFF"/>
                 </a:solidFill>
               </a:rPr>
-              <a:t>Div contenitore</a:t>
+              <a:t>Tabelle</a:t>
             </a:r>
             <a:endParaRPr sz="3800">
               <a:solidFill>
@@ -3756,23 +3889,92 @@
             </a:endParaRPr>
           </a:p>
           <a:p>
-            <a:pPr lvl="0" marL="965200" indent="-965200">
-              <a:buClr>
-                <a:srgbClr val="FFFFFF"/>
-              </a:buClr>
-              <a:defRPr sz="1800">
-                <a:solidFill>
-                  <a:srgbClr val="000000"/>
-                </a:solidFill>
-              </a:defRPr>
-            </a:pPr>
+            <a:pPr lvl="1" marL="815473" indent="-307473">
+              <a:buSzPct val="100000"/>
+              <a:buAutoNum type="arabicPeriod" startAt="1"/>
+              <a:defRPr sz="1800">
+                <a:solidFill>
+                  <a:srgbClr val="000000"/>
+                </a:solidFill>
+              </a:defRPr>
+            </a:pPr>
+            <a:r>
+              <a:rPr sz="2300">
+                <a:solidFill>
+                  <a:srgbClr val="FFFEFE"/>
+                </a:solidFill>
+              </a:rPr>
+              <a:t> contenitore delle celle (div)</a:t>
+            </a:r>
+            <a:endParaRPr sz="2300">
+              <a:solidFill>
+                <a:srgbClr val="FFFEFE"/>
+              </a:solidFill>
+            </a:endParaRPr>
+          </a:p>
+          <a:p>
+            <a:pPr lvl="1" marL="815473" indent="-307473">
+              <a:buSzPct val="100000"/>
+              <a:buAutoNum type="arabicPeriod" startAt="1"/>
+              <a:defRPr sz="1800">
+                <a:solidFill>
+                  <a:srgbClr val="000000"/>
+                </a:solidFill>
+              </a:defRPr>
+            </a:pPr>
+            <a:r>
+              <a:rPr sz="2300">
+                <a:solidFill>
+                  <a:srgbClr val="FFFEFE"/>
+                </a:solidFill>
+              </a:rPr>
+              <a:t>contenitore timer, contatore mosse e nome</a:t>
+            </a:r>
+            <a:endParaRPr sz="3800">
+              <a:solidFill>
+                <a:srgbClr val="FFFEFE"/>
+              </a:solidFill>
+            </a:endParaRPr>
+          </a:p>
+          <a:p>
+            <a:pPr lvl="0" marL="180473" indent="-180473">
+              <a:buSzPct val="60000"/>
+              <a:buBlip>
+                <a:blip r:embed="rId2"/>
+              </a:buBlip>
+              <a:defRPr sz="1800">
+                <a:solidFill>
+                  <a:srgbClr val="000000"/>
+                </a:solidFill>
+              </a:defRPr>
+            </a:pPr>
+            <a:r>
+              <a:rPr sz="3800"/>
+              <a:t>  </a:t>
+            </a:r>
             <a:r>
               <a:rPr sz="3800">
                 <a:solidFill>
                   <a:srgbClr val="FFFFFF"/>
                 </a:solidFill>
               </a:rPr>
-              <a:t>3 menu (top, middle, bottom)</a:t>
+              <a:t>M</a:t>
+            </a:r>
+            <a:r>
+              <a:rPr sz="3800">
+                <a:solidFill>
+                  <a:srgbClr val="FFFFFF"/>
+                </a:solidFill>
+              </a:rPr>
+              <a:t>enù</a:t>
+            </a:r>
+            <a:r>
+              <a:rPr sz="3800">
+                <a:solidFill>
+                  <a:srgbClr val="FFFFFF"/>
+                </a:solidFill>
+              </a:rPr>
+              <a:t>:</a:t>
             </a:r>
             <a:endParaRPr sz="3800">
               <a:solidFill>
@@ -3781,24 +3983,228 @@
             </a:endParaRPr>
           </a:p>
           <a:p>
-            <a:pPr lvl="0" marL="965200" indent="-965200">
-              <a:buClr>
-                <a:srgbClr val="FFFFFF"/>
-              </a:buClr>
-              <a:defRPr sz="1800">
-                <a:solidFill>
-                  <a:srgbClr val="000000"/>
-                </a:solidFill>
-              </a:defRPr>
-            </a:pPr>
-            <a:r>
-              <a:rPr sz="3800">
-                <a:solidFill>
-                  <a:srgbClr val="FFFFFF"/>
-                </a:solidFill>
-              </a:rPr>
-              <a:t>Bottom table</a:t>
-            </a:r>
+            <a:pPr lvl="1" marL="815473" indent="-307473">
+              <a:buSzPct val="100000"/>
+              <a:buAutoNum type="arabicPeriod" startAt="3"/>
+              <a:defRPr sz="1800">
+                <a:solidFill>
+                  <a:srgbClr val="000000"/>
+                </a:solidFill>
+              </a:defRPr>
+            </a:pPr>
+            <a:r>
+              <a:rPr sz="2300">
+                <a:solidFill>
+                  <a:srgbClr val="FDFFFF"/>
+                </a:solidFill>
+              </a:rPr>
+              <a:t>Top-menù: grafica</a:t>
+            </a:r>
+            <a:endParaRPr sz="2300">
+              <a:solidFill>
+                <a:srgbClr val="FDFFFF"/>
+              </a:solidFill>
+            </a:endParaRPr>
+          </a:p>
+          <a:p>
+            <a:pPr lvl="1" marL="815473" indent="-307473">
+              <a:buSzPct val="100000"/>
+              <a:buAutoNum type="arabicPeriod" startAt="3"/>
+              <a:defRPr sz="1800">
+                <a:solidFill>
+                  <a:srgbClr val="000000"/>
+                </a:solidFill>
+              </a:defRPr>
+            </a:pPr>
+            <a:r>
+              <a:rPr sz="2300">
+                <a:solidFill>
+                  <a:srgbClr val="FFFBFB"/>
+                </a:solidFill>
+              </a:rPr>
+              <a:t>Middle-menù: azioni partita</a:t>
+            </a:r>
+            <a:endParaRPr sz="2300">
+              <a:solidFill>
+                <a:srgbClr val="FFFBFB"/>
+              </a:solidFill>
+            </a:endParaRPr>
+          </a:p>
+          <a:p>
+            <a:pPr lvl="1" marL="815473" indent="-307473">
+              <a:buSzPct val="100000"/>
+              <a:buAutoNum type="arabicPeriod" startAt="3"/>
+              <a:defRPr sz="1800">
+                <a:solidFill>
+                  <a:srgbClr val="000000"/>
+                </a:solidFill>
+              </a:defRPr>
+            </a:pPr>
+            <a:r>
+              <a:rPr sz="2300">
+                <a:solidFill>
+                  <a:srgbClr val="FBFCFF"/>
+                </a:solidFill>
+              </a:rPr>
+              <a:t>Bottom-menù: informazioni e manuale</a:t>
+            </a:r>
+          </a:p>
+        </p:txBody>
+      </p:sp>
+      <p:sp>
+        <p:nvSpPr>
+          <p:cNvPr id="39" name="Shape 39"/>
+          <p:cNvSpPr/>
+          <p:nvPr/>
+        </p:nvSpPr>
+        <p:spPr>
+          <a:xfrm>
+            <a:off x="6959072" y="3077373"/>
+            <a:ext cx="1763961" cy="1399252"/>
+          </a:xfrm>
+          <a:prstGeom prst="rect">
+            <a:avLst/>
+          </a:prstGeom>
+          <a:solidFill>
+            <a:srgbClr val="FFFFFF"/>
+          </a:solidFill>
+          <a:ln w="25400">
+            <a:solidFill>
+              <a:srgbClr val="0065C1"/>
+            </a:solidFill>
+          </a:ln>
+          <a:effectLst>
+            <a:outerShdw sx="100000" sy="100000" kx="0" ky="0" algn="b" rotWithShape="0" blurRad="76200" dist="0" dir="18900000">
+              <a:srgbClr val="000000">
+                <a:alpha val="80000"/>
+              </a:srgbClr>
+            </a:outerShdw>
+          </a:effectLst>
+          <a:extLst>
+            <a:ext uri="{C572A759-6A51-4108-AA02-DFA0A04FC94B}">
+              <ma14:wrappingTextBoxFlag xmlns:ma14="http://schemas.microsoft.com/office/mac/drawingml/2011/main" val="1"/>
+            </a:ext>
+          </a:extLst>
+        </p:spPr>
+        <p:txBody>
+          <a:bodyPr lIns="0" tIns="0" rIns="0" bIns="0" anchor="ctr"/>
+          <a:lstStyle>
+            <a:lvl1pPr>
+              <a:defRPr sz="3100">
+                <a:solidFill>
+                  <a:srgbClr val="000000"/>
+                </a:solidFill>
+                <a:latin typeface="Helvetica Light"/>
+                <a:ea typeface="Helvetica Light"/>
+                <a:cs typeface="Helvetica Light"/>
+                <a:sym typeface="Helvetica Light"/>
+              </a:defRPr>
+            </a:lvl1pPr>
+          </a:lstStyle>
+          <a:p>
+            <a:pPr lvl="0">
+              <a:defRPr sz="1800"/>
+            </a:pPr>
+            <a:r>
+              <a:rPr sz="3100"/>
+              <a:t>Padre</a:t>
+            </a:r>
+          </a:p>
+        </p:txBody>
+      </p:sp>
+      <p:sp>
+        <p:nvSpPr>
+          <p:cNvPr id="40" name="Shape 40"/>
+          <p:cNvSpPr/>
+          <p:nvPr/>
+        </p:nvSpPr>
+        <p:spPr>
+          <a:xfrm>
+            <a:off x="6971772" y="3090073"/>
+            <a:ext cx="505670" cy="505613"/>
+          </a:xfrm>
+          <a:prstGeom prst="rect">
+            <a:avLst/>
+          </a:prstGeom>
+          <a:solidFill>
+            <a:srgbClr val="FFFFFF"/>
+          </a:solidFill>
+          <a:ln w="25400">
+            <a:solidFill>
+              <a:srgbClr val="0065C1"/>
+            </a:solidFill>
+          </a:ln>
+          <a:effectLst>
+            <a:outerShdw sx="100000" sy="100000" kx="0" ky="0" algn="b" rotWithShape="0" blurRad="76200" dist="0" dir="18900000">
+              <a:srgbClr val="000000">
+                <a:alpha val="80000"/>
+              </a:srgbClr>
+            </a:outerShdw>
+          </a:effectLst>
+        </p:spPr>
+        <p:txBody>
+          <a:bodyPr lIns="0" tIns="0" rIns="0" bIns="0" anchor="ctr"/>
+          <a:lstStyle/>
+          <a:p>
+            <a:pPr lvl="0">
+              <a:defRPr sz="1600">
+                <a:solidFill>
+                  <a:srgbClr val="FF0000"/>
+                </a:solidFill>
+                <a:latin typeface="Helvetica Light"/>
+                <a:ea typeface="Helvetica Light"/>
+                <a:cs typeface="Helvetica Light"/>
+                <a:sym typeface="Helvetica Light"/>
+              </a:defRPr>
+            </a:pPr>
+          </a:p>
+        </p:txBody>
+      </p:sp>
+      <p:sp>
+        <p:nvSpPr>
+          <p:cNvPr id="41" name="Shape 41"/>
+          <p:cNvSpPr/>
+          <p:nvPr/>
+        </p:nvSpPr>
+        <p:spPr>
+          <a:xfrm>
+            <a:off x="7492472" y="3090073"/>
+            <a:ext cx="505670" cy="505613"/>
+          </a:xfrm>
+          <a:prstGeom prst="rect">
+            <a:avLst/>
+          </a:prstGeom>
+          <a:solidFill>
+            <a:srgbClr val="FFFFFF"/>
+          </a:solidFill>
+          <a:ln w="25400">
+            <a:solidFill>
+              <a:srgbClr val="0065C1"/>
+            </a:solidFill>
+          </a:ln>
+          <a:effectLst>
+            <a:outerShdw sx="100000" sy="100000" kx="0" ky="0" algn="b" rotWithShape="0" blurRad="76200" dist="0" dir="18900000">
+              <a:srgbClr val="000000">
+                <a:alpha val="80000"/>
+              </a:srgbClr>
+            </a:outerShdw>
+          </a:effectLst>
+        </p:spPr>
+        <p:txBody>
+          <a:bodyPr lIns="0" tIns="0" rIns="0" bIns="0" anchor="ctr"/>
+          <a:lstStyle/>
+          <a:p>
+            <a:pPr lvl="0">
+              <a:defRPr sz="1600">
+                <a:solidFill>
+                  <a:srgbClr val="FF0000"/>
+                </a:solidFill>
+                <a:latin typeface="Helvetica Light"/>
+                <a:ea typeface="Helvetica Light"/>
+                <a:cs typeface="Helvetica Light"/>
+                <a:sym typeface="Helvetica Light"/>
+              </a:defRPr>
+            </a:pPr>
           </a:p>
         </p:txBody>
       </p:sp>
@@ -3830,7 +4236,7 @@
       </p:grpSpPr>
       <p:sp>
         <p:nvSpPr>
-          <p:cNvPr id="40" name="Shape 40"/>
+          <p:cNvPr id="43" name="Shape 43"/>
           <p:cNvSpPr/>
           <p:nvPr>
             <p:ph type="title"/>
@@ -3869,7 +4275,7 @@
       </p:sp>
       <p:sp>
         <p:nvSpPr>
-          <p:cNvPr id="41" name="Shape 41"/>
+          <p:cNvPr id="44" name="Shape 44"/>
           <p:cNvSpPr/>
           <p:nvPr>
             <p:ph type="body" idx="1"/>
@@ -3902,25 +4308,28 @@
                 <a:solidFill>
                   <a:srgbClr val="FFFFFF"/>
                 </a:solidFill>
-                <a:latin typeface="+mn-lt"/>
-                <a:ea typeface="+mn-ea"/>
-                <a:cs typeface="+mn-cs"/>
+                <a:latin typeface="+mj-lt"/>
+                <a:ea typeface="+mj-ea"/>
+                <a:cs typeface="+mj-cs"/>
                 <a:sym typeface="Helvetica"/>
               </a:rPr>
               <a:t>100%CSS</a:t>
             </a:r>
             <a:endParaRPr b="1">
-              <a:latin typeface="+mn-lt"/>
-              <a:ea typeface="+mn-ea"/>
-              <a:cs typeface="+mn-cs"/>
+              <a:latin typeface="+mj-lt"/>
+              <a:ea typeface="+mj-ea"/>
+              <a:cs typeface="+mj-cs"/>
               <a:sym typeface="Helvetica"/>
             </a:endParaRPr>
           </a:p>
           <a:p>
-            <a:pPr lvl="0" marL="965200" indent="-965200">
+            <a:pPr lvl="0" marL="2037644" indent="-2037644">
               <a:buClr>
                 <a:srgbClr val="FFFFFF"/>
               </a:buClr>
+              <a:buBlip>
+                <a:blip r:embed="rId2"/>
+              </a:buBlip>
               <a:defRPr sz="1800">
                 <a:solidFill>
                   <a:srgbClr val="000000"/>
@@ -3935,17 +4344,15 @@
               </a:rPr>
               <a:t>L’intera grafica è stata realizzata utilizzando CSS (senza utilizzo di immagini o altri media)</a:t>
             </a:r>
-            <a:endParaRPr sz="3800">
-              <a:solidFill>
-                <a:srgbClr val="FFFFFF"/>
-              </a:solidFill>
-            </a:endParaRPr>
-          </a:p>
-          <a:p>
-            <a:pPr lvl="0" marL="965200" indent="-965200">
+          </a:p>
+          <a:p>
+            <a:pPr lvl="0" marL="2037644" indent="-2037644">
               <a:buClr>
                 <a:srgbClr val="FFFFFF"/>
               </a:buClr>
+              <a:buBlip>
+                <a:blip r:embed="rId2"/>
+              </a:buBlip>
               <a:defRPr sz="1800">
                 <a:solidFill>
                   <a:srgbClr val="000000"/>
@@ -3991,7 +4398,7 @@
       </p:grpSpPr>
       <p:sp>
         <p:nvSpPr>
-          <p:cNvPr id="43" name="Shape 43"/>
+          <p:cNvPr id="46" name="Shape 46"/>
           <p:cNvSpPr/>
           <p:nvPr>
             <p:ph type="title"/>
@@ -4073,7 +4480,7 @@
                             </p:stCondLst>
                             <p:childTnLst>
                               <p:par>
-                                <p:cTn id="5" nodeType="clickEffect" presetClass="entr" presetSubtype="0" presetID="9" grpId="1" fill="hold">
+                                <p:cTn id="5" nodeType="clickEffect" presetClass="entr" presetSubtype="0" presetID="10" grpId="1" fill="hold">
                                   <p:stCondLst>
                                     <p:cond delay="0"/>
                                   </p:stCondLst>
@@ -4085,7 +4492,7 @@
                                       <p:cBhvr>
                                         <p:cTn id="6" fill="hold"/>
                                         <p:tgtEl>
-                                          <p:spTgt spid="43"/>
+                                          <p:spTgt spid="46"/>
                                         </p:tgtEl>
                                         <p:attrNameLst>
                                           <p:attrName>style.visibility</p:attrName>
@@ -4095,11 +4502,11 @@
                                         <p:strVal val="visible"/>
                                       </p:to>
                                     </p:set>
-                                    <p:animEffect filter="dissolve" transition="in">
+                                    <p:animEffect filter="fade" transition="in">
                                       <p:cBhvr>
                                         <p:cTn id="7" dur="1500"/>
                                         <p:tgtEl>
-                                          <p:spTgt spid="43"/>
+                                          <p:spTgt spid="46"/>
                                         </p:tgtEl>
                                       </p:cBhvr>
                                     </p:animEffect>
@@ -4134,127 +4541,13 @@
       </p:par>
     </p:tnLst>
     <p:bldLst>
-      <p:bldP build="whole" bldLvl="1" animBg="1" rev="0" advAuto="0" spid="43" grpId="1"/>
+      <p:bldP build="whole" bldLvl="1" animBg="1" rev="0" advAuto="0" spid="46" grpId="1"/>
     </p:bldLst>
   </p:timing>
 </p:sld>
 </file>
 
 <file path=ppt/slides/slide6.xml><?xml version="1.0" encoding="utf-8"?>
-<p:sld xmlns:a="http://schemas.openxmlformats.org/drawingml/2006/main" xmlns:r="http://schemas.openxmlformats.org/officeDocument/2006/relationships" xmlns:p="http://schemas.openxmlformats.org/presentationml/2006/main" showMasterSp="1" showMasterPhAnim="1">
-  <p:cSld>
-    <p:spTree>
-      <p:nvGrpSpPr>
-        <p:cNvPr id="1" name=""/>
-        <p:cNvGrpSpPr/>
-        <p:nvPr/>
-      </p:nvGrpSpPr>
-      <p:grpSpPr>
-        <a:xfrm>
-          <a:off x="0" y="0"/>
-          <a:ext cx="0" cy="0"/>
-          <a:chOff x="0" y="0"/>
-          <a:chExt cx="0" cy="0"/>
-        </a:xfrm>
-      </p:grpSpPr>
-      <p:sp>
-        <p:nvSpPr>
-          <p:cNvPr id="45" name="Shape 45"/>
-          <p:cNvSpPr/>
-          <p:nvPr>
-            <p:ph type="title"/>
-          </p:nvPr>
-        </p:nvSpPr>
-        <p:spPr>
-          <a:xfrm>
-            <a:off x="952500" y="660400"/>
-            <a:ext cx="11099800" cy="2120900"/>
-          </a:xfrm>
-          <a:prstGeom prst="rect">
-            <a:avLst/>
-          </a:prstGeom>
-        </p:spPr>
-        <p:txBody>
-          <a:bodyPr/>
-          <a:lstStyle>
-            <a:lvl1pPr defTabSz="484886">
-              <a:defRPr sz="6600"/>
-            </a:lvl1pPr>
-          </a:lstStyle>
-          <a:p>
-            <a:pPr lvl="0">
-              <a:defRPr sz="1800">
-                <a:solidFill>
-                  <a:srgbClr val="000000"/>
-                </a:solidFill>
-              </a:defRPr>
-            </a:pPr>
-            <a:r>
-              <a:rPr sz="6600">
-                <a:solidFill>
-                  <a:srgbClr val="FFFFFF"/>
-                </a:solidFill>
-              </a:rPr>
-              <a:t>Ragionamento inserimento tabella</a:t>
-            </a:r>
-          </a:p>
-        </p:txBody>
-      </p:sp>
-      <p:sp>
-        <p:nvSpPr>
-          <p:cNvPr id="46" name="Shape 46"/>
-          <p:cNvSpPr/>
-          <p:nvPr>
-            <p:ph type="body" idx="1"/>
-          </p:nvPr>
-        </p:nvSpPr>
-        <p:spPr>
-          <a:xfrm>
-            <a:off x="952500" y="2590800"/>
-            <a:ext cx="11099800" cy="6286500"/>
-          </a:xfrm>
-          <a:prstGeom prst="rect">
-            <a:avLst/>
-          </a:prstGeom>
-        </p:spPr>
-        <p:txBody>
-          <a:bodyPr/>
-          <a:lstStyle>
-            <a:lvl1pPr marL="965200" indent="-965200">
-              <a:buClr>
-                <a:srgbClr val="FFFFFF"/>
-              </a:buClr>
-            </a:lvl1pPr>
-          </a:lstStyle>
-          <a:p>
-            <a:pPr lvl="0">
-              <a:defRPr sz="1800">
-                <a:solidFill>
-                  <a:srgbClr val="000000"/>
-                </a:solidFill>
-              </a:defRPr>
-            </a:pPr>
-            <a:r>
-              <a:rPr sz="3800">
-                <a:solidFill>
-                  <a:srgbClr val="FFFFFF"/>
-                </a:solidFill>
-              </a:rPr>
-              <a:t>Tabella creata dinamicamente utlilizzando script jQuery e appendendo 16 div al div contenitore</a:t>
-            </a:r>
-          </a:p>
-        </p:txBody>
-      </p:sp>
-    </p:spTree>
-  </p:cSld>
-  <p:clrMapOvr>
-    <a:masterClrMapping/>
-  </p:clrMapOvr>
-  <p:transition spd="med" advClick="1"/>
-</p:sld>
-</file>
-
-<file path=ppt/slides/slide7.xml><?xml version="1.0" encoding="utf-8"?>
 <p:sld xmlns:a="http://schemas.openxmlformats.org/drawingml/2006/main" xmlns:r="http://schemas.openxmlformats.org/officeDocument/2006/relationships" xmlns:p="http://schemas.openxmlformats.org/presentationml/2006/main" showMasterSp="1" showMasterPhAnim="1">
   <p:cSld>
     <p:spTree>
@@ -4281,7 +4574,7 @@
         </p:nvSpPr>
         <p:spPr>
           <a:xfrm>
-            <a:off x="952500" y="406400"/>
+            <a:off x="952500" y="660400"/>
             <a:ext cx="11099800" cy="2120900"/>
           </a:xfrm>
           <a:prstGeom prst="rect">
@@ -4290,7 +4583,11 @@
         </p:spPr>
         <p:txBody>
           <a:bodyPr/>
-          <a:lstStyle/>
+          <a:lstStyle>
+            <a:lvl1pPr defTabSz="484886">
+              <a:defRPr sz="6600"/>
+            </a:lvl1pPr>
+          </a:lstStyle>
           <a:p>
             <a:pPr lvl="0">
               <a:defRPr sz="1800">
@@ -4300,27 +4597,12 @@
               </a:defRPr>
             </a:pPr>
             <a:r>
-              <a:rPr sz="5400">
-                <a:solidFill>
-                  <a:srgbClr val="FFFFFF"/>
-                </a:solidFill>
-              </a:rPr>
-              <a:t>Ragionamento mescolamento</a:t>
-            </a:r>
-            <a:br>
-              <a:rPr sz="5400">
-                <a:solidFill>
-                  <a:srgbClr val="FFFFFF"/>
-                </a:solidFill>
-              </a:rPr>
-            </a:br>
-            <a:r>
-              <a:rPr sz="5400">
-                <a:solidFill>
-                  <a:srgbClr val="FFFFFF"/>
-                </a:solidFill>
-              </a:rPr>
-              <a:t>(Massimino)</a:t>
+              <a:rPr sz="6600">
+                <a:solidFill>
+                  <a:srgbClr val="FFFFFF"/>
+                </a:solidFill>
+              </a:rPr>
+              <a:t>Ragionamento inserimento tabella</a:t>
             </a:r>
           </a:p>
         </p:txBody>
@@ -4344,9 +4626,32 @@
         </p:spPr>
         <p:txBody>
           <a:bodyPr/>
-          <a:lstStyle/>
-          <a:p>
-            <a:pPr lvl="0"/>
+          <a:lstStyle>
+            <a:lvl1pPr marL="2037644" indent="-2037644">
+              <a:buClr>
+                <a:srgbClr val="FFFFFF"/>
+              </a:buClr>
+              <a:buBlip>
+                <a:blip r:embed="rId2"/>
+              </a:buBlip>
+            </a:lvl1pPr>
+          </a:lstStyle>
+          <a:p>
+            <a:pPr lvl="0">
+              <a:defRPr sz="1800">
+                <a:solidFill>
+                  <a:srgbClr val="000000"/>
+                </a:solidFill>
+              </a:defRPr>
+            </a:pPr>
+            <a:r>
+              <a:rPr sz="3800">
+                <a:solidFill>
+                  <a:srgbClr val="FFFFFF"/>
+                </a:solidFill>
+              </a:rPr>
+              <a:t>Tabella creata dinamicamente utlilizzando script jQuery e appendendo 16 div al div contenitore</a:t>
+            </a:r>
           </a:p>
         </p:txBody>
       </p:sp>
@@ -4359,7 +4664,7 @@
 </p:sld>
 </file>
 
-<file path=ppt/slides/slide8.xml><?xml version="1.0" encoding="utf-8"?>
+<file path=ppt/slides/slide7.xml><?xml version="1.0" encoding="utf-8"?>
 <p:sld xmlns:a="http://schemas.openxmlformats.org/drawingml/2006/main" xmlns:r="http://schemas.openxmlformats.org/officeDocument/2006/relationships" xmlns:p="http://schemas.openxmlformats.org/presentationml/2006/main" showMasterSp="1" showMasterPhAnim="1">
   <p:cSld>
     <p:spTree>
@@ -4395,11 +4700,7 @@
         </p:spPr>
         <p:txBody>
           <a:bodyPr/>
-          <a:lstStyle>
-            <a:lvl1pPr defTabSz="502412">
-              <a:defRPr sz="6800"/>
-            </a:lvl1pPr>
-          </a:lstStyle>
+          <a:lstStyle/>
           <a:p>
             <a:pPr lvl="0">
               <a:defRPr sz="1800">
@@ -4409,12 +4710,27 @@
               </a:defRPr>
             </a:pPr>
             <a:r>
-              <a:rPr sz="6800">
-                <a:solidFill>
-                  <a:srgbClr val="FFFFFF"/>
-                </a:solidFill>
-              </a:rPr>
-              <a:t>Ragionamento click su cella</a:t>
+              <a:rPr sz="5400">
+                <a:solidFill>
+                  <a:srgbClr val="FFFFFF"/>
+                </a:solidFill>
+              </a:rPr>
+              <a:t>Ragionamento mescolamento</a:t>
+            </a:r>
+            <a:br>
+              <a:rPr sz="5400">
+                <a:solidFill>
+                  <a:srgbClr val="FFFFFF"/>
+                </a:solidFill>
+              </a:rPr>
+            </a:br>
+            <a:r>
+              <a:rPr sz="5400">
+                <a:solidFill>
+                  <a:srgbClr val="FFFFFF"/>
+                </a:solidFill>
+              </a:rPr>
+              <a:t>(Massimino)</a:t>
             </a:r>
           </a:p>
         </p:txBody>
@@ -4440,10 +4756,111 @@
           <a:bodyPr/>
           <a:lstStyle/>
           <a:p>
-            <a:pPr lvl="0" marL="965200" indent="-965200">
+            <a:pPr lvl="0">
+              <a:buBlip>
+                <a:blip r:embed="rId2"/>
+              </a:buBlip>
+            </a:pPr>
+          </a:p>
+        </p:txBody>
+      </p:sp>
+    </p:spTree>
+  </p:cSld>
+  <p:clrMapOvr>
+    <a:masterClrMapping/>
+  </p:clrMapOvr>
+  <p:transition spd="med" advClick="1"/>
+</p:sld>
+</file>
+
+<file path=ppt/slides/slide8.xml><?xml version="1.0" encoding="utf-8"?>
+<p:sld xmlns:a="http://schemas.openxmlformats.org/drawingml/2006/main" xmlns:r="http://schemas.openxmlformats.org/officeDocument/2006/relationships" xmlns:p="http://schemas.openxmlformats.org/presentationml/2006/main" showMasterSp="1" showMasterPhAnim="1">
+  <p:cSld>
+    <p:spTree>
+      <p:nvGrpSpPr>
+        <p:cNvPr id="1" name=""/>
+        <p:cNvGrpSpPr/>
+        <p:nvPr/>
+      </p:nvGrpSpPr>
+      <p:grpSpPr>
+        <a:xfrm>
+          <a:off x="0" y="0"/>
+          <a:ext cx="0" cy="0"/>
+          <a:chOff x="0" y="0"/>
+          <a:chExt cx="0" cy="0"/>
+        </a:xfrm>
+      </p:grpSpPr>
+      <p:sp>
+        <p:nvSpPr>
+          <p:cNvPr id="54" name="Shape 54"/>
+          <p:cNvSpPr/>
+          <p:nvPr>
+            <p:ph type="title"/>
+          </p:nvPr>
+        </p:nvSpPr>
+        <p:spPr>
+          <a:xfrm>
+            <a:off x="952500" y="406400"/>
+            <a:ext cx="11099800" cy="2120900"/>
+          </a:xfrm>
+          <a:prstGeom prst="rect">
+            <a:avLst/>
+          </a:prstGeom>
+        </p:spPr>
+        <p:txBody>
+          <a:bodyPr/>
+          <a:lstStyle>
+            <a:lvl1pPr defTabSz="502412">
+              <a:defRPr sz="6800"/>
+            </a:lvl1pPr>
+          </a:lstStyle>
+          <a:p>
+            <a:pPr lvl="0">
+              <a:defRPr sz="1800">
+                <a:solidFill>
+                  <a:srgbClr val="000000"/>
+                </a:solidFill>
+              </a:defRPr>
+            </a:pPr>
+            <a:r>
+              <a:rPr sz="6800">
+                <a:solidFill>
+                  <a:srgbClr val="FFFFFF"/>
+                </a:solidFill>
+              </a:rPr>
+              <a:t>Ragionamento click su cella</a:t>
+            </a:r>
+          </a:p>
+        </p:txBody>
+      </p:sp>
+      <p:sp>
+        <p:nvSpPr>
+          <p:cNvPr id="55" name="Shape 55"/>
+          <p:cNvSpPr/>
+          <p:nvPr>
+            <p:ph type="body" idx="1"/>
+          </p:nvPr>
+        </p:nvSpPr>
+        <p:spPr>
+          <a:xfrm>
+            <a:off x="952500" y="2590800"/>
+            <a:ext cx="11099800" cy="6286500"/>
+          </a:xfrm>
+          <a:prstGeom prst="rect">
+            <a:avLst/>
+          </a:prstGeom>
+        </p:spPr>
+        <p:txBody>
+          <a:bodyPr/>
+          <a:lstStyle/>
+          <a:p>
+            <a:pPr lvl="0" marL="2037644" indent="-2037644">
               <a:buClr>
                 <a:srgbClr val="FFFFFF"/>
               </a:buClr>
+              <a:buBlip>
+                <a:blip r:embed="rId2"/>
+              </a:buBlip>
               <a:defRPr sz="1800">
                 <a:solidFill>
                   <a:srgbClr val="000000"/>
@@ -4458,17 +4875,15 @@
               </a:rPr>
               <a:t>Non si modificano gli ID ma si lavora sui testi</a:t>
             </a:r>
-            <a:endParaRPr sz="3800">
-              <a:solidFill>
-                <a:srgbClr val="FFFFFF"/>
-              </a:solidFill>
-            </a:endParaRPr>
-          </a:p>
-          <a:p>
-            <a:pPr lvl="0" marL="965200" indent="-965200">
+          </a:p>
+          <a:p>
+            <a:pPr lvl="0" marL="2037644" indent="-2037644">
               <a:buClr>
                 <a:srgbClr val="FFFFFF"/>
               </a:buClr>
+              <a:buBlip>
+                <a:blip r:embed="rId2"/>
+              </a:buBlip>
               <a:defRPr sz="1800">
                 <a:solidFill>
                   <a:srgbClr val="000000"/>
@@ -4483,17 +4898,15 @@
               </a:rPr>
               <a:t>Utilizzo un vettore di appoggio</a:t>
             </a:r>
-            <a:endParaRPr sz="3800">
-              <a:solidFill>
-                <a:srgbClr val="FFFFFF"/>
-              </a:solidFill>
-            </a:endParaRPr>
-          </a:p>
-          <a:p>
-            <a:pPr lvl="0" marL="965200" indent="-965200">
+          </a:p>
+          <a:p>
+            <a:pPr lvl="0" marL="2037644" indent="-2037644">
               <a:buClr>
                 <a:srgbClr val="FFFFFF"/>
               </a:buClr>
+              <a:buBlip>
+                <a:blip r:embed="rId2"/>
+              </a:buBlip>
               <a:defRPr sz="1800">
                 <a:solidFill>
                   <a:srgbClr val="000000"/>
@@ -4539,7 +4952,7 @@
       </p:grpSpPr>
       <p:sp>
         <p:nvSpPr>
-          <p:cNvPr id="54" name="Shape 54"/>
+          <p:cNvPr id="57" name="Shape 57"/>
           <p:cNvSpPr/>
           <p:nvPr>
             <p:ph type="title"/>
@@ -4621,7 +5034,7 @@
                             </p:stCondLst>
                             <p:childTnLst>
                               <p:par>
-                                <p:cTn id="5" nodeType="clickEffect" presetClass="entr" presetSubtype="0" presetID="9" grpId="1" fill="hold">
+                                <p:cTn id="5" nodeType="clickEffect" presetClass="entr" presetSubtype="0" presetID="10" grpId="1" fill="hold">
                                   <p:stCondLst>
                                     <p:cond delay="0"/>
                                   </p:stCondLst>
@@ -4633,7 +5046,7 @@
                                       <p:cBhvr>
                                         <p:cTn id="6" fill="hold"/>
                                         <p:tgtEl>
-                                          <p:spTgt spid="54"/>
+                                          <p:spTgt spid="57"/>
                                         </p:tgtEl>
                                         <p:attrNameLst>
                                           <p:attrName>style.visibility</p:attrName>
@@ -4643,11 +5056,11 @@
                                         <p:strVal val="visible"/>
                                       </p:to>
                                     </p:set>
-                                    <p:animEffect filter="dissolve" transition="in">
+                                    <p:animEffect filter="fade" transition="in">
                                       <p:cBhvr>
                                         <p:cTn id="7" dur="1500"/>
                                         <p:tgtEl>
-                                          <p:spTgt spid="54"/>
+                                          <p:spTgt spid="57"/>
                                         </p:tgtEl>
                                       </p:cBhvr>
                                     </p:animEffect>
@@ -4682,7 +5095,7 @@
       </p:par>
     </p:tnLst>
     <p:bldLst>
-      <p:bldP build="whole" bldLvl="1" animBg="1" rev="0" advAuto="0" spid="54" grpId="1"/>
+      <p:bldP build="whole" bldLvl="1" animBg="1" rev="0" advAuto="0" spid="57" grpId="1"/>
     </p:bldLst>
   </p:timing>
 </p:sld>
@@ -4693,10 +5106,10 @@
   <a:themeElements>
     <a:clrScheme name="Default">
       <a:dk1>
-        <a:srgbClr val="FFFFFF"/>
+        <a:srgbClr val="000000"/>
       </a:dk1>
       <a:lt1>
-        <a:srgbClr val="FF0000"/>
+        <a:srgbClr val="FFFFFF"/>
       </a:lt1>
       <a:dk2>
         <a:srgbClr val="A7A7A7"/>
@@ -4731,14 +5144,14 @@
     </a:clrScheme>
     <a:fontScheme name="Default">
       <a:majorFont>
+        <a:latin typeface="Helvetica"/>
+        <a:ea typeface="Helvetica"/>
+        <a:cs typeface="Helvetica"/>
+      </a:majorFont>
+      <a:minorFont>
         <a:latin typeface="Helvetica Neue"/>
         <a:ea typeface="Helvetica Neue"/>
         <a:cs typeface="Helvetica Neue"/>
-      </a:majorFont>
-      <a:minorFont>
-        <a:latin typeface="Helvetica"/>
-        <a:ea typeface="Helvetica"/>
-        <a:cs typeface="Helvetica"/>
       </a:minorFont>
     </a:fontScheme>
     <a:fmtScheme name="Default">
@@ -4897,7 +5310,7 @@
     <a:spDef>
       <a:spPr>
         <a:solidFill>
-          <a:srgbClr val="FFFFFF"/>
+          <a:srgbClr val="FF0000"/>
         </a:solidFill>
         <a:ln w="25400" cap="flat">
           <a:solidFill>
@@ -4938,14 +5351,14 @@
               <a:noFill/>
             </a:ln>
             <a:solidFill>
-              <a:srgbClr val="FF0000"/>
+              <a:srgbClr val="FFFFFF"/>
             </a:solidFill>
             <a:effectLst/>
             <a:uFillTx/>
-            <a:latin typeface="Helvetica Light"/>
-            <a:ea typeface="Helvetica Light"/>
-            <a:cs typeface="Helvetica Light"/>
-            <a:sym typeface="Helvetica Light"/>
+            <a:latin typeface="+mj-lt"/>
+            <a:ea typeface="+mj-ea"/>
+            <a:cs typeface="+mj-cs"/>
+            <a:sym typeface="Helvetica"/>
           </a:defRPr>
         </a:defPPr>
         <a:lvl1pPr marL="0" marR="0" indent="0" algn="l" defTabSz="914400" rtl="0" fontAlgn="auto" latinLnBrk="1" hangingPunct="0">
@@ -5513,14 +5926,14 @@
               <a:noFill/>
             </a:ln>
             <a:solidFill>
-              <a:srgbClr val="FF0000"/>
+              <a:srgbClr val="FFFFFF"/>
             </a:solidFill>
             <a:effectLst/>
             <a:uFillTx/>
-            <a:latin typeface="Helvetica Light"/>
-            <a:ea typeface="Helvetica Light"/>
-            <a:cs typeface="Helvetica Light"/>
-            <a:sym typeface="Helvetica Light"/>
+            <a:latin typeface="+mj-lt"/>
+            <a:ea typeface="+mj-ea"/>
+            <a:cs typeface="+mj-cs"/>
+            <a:sym typeface="Helvetica"/>
           </a:defRPr>
         </a:defPPr>
         <a:lvl1pPr marL="0" marR="0" indent="0" algn="l" defTabSz="914400" rtl="0" fontAlgn="auto" latinLnBrk="1" hangingPunct="0">
@@ -5812,14 +6225,14 @@
     </a:clrScheme>
     <a:fontScheme name="Default">
       <a:majorFont>
+        <a:latin typeface="Helvetica"/>
+        <a:ea typeface="Helvetica"/>
+        <a:cs typeface="Helvetica"/>
+      </a:majorFont>
+      <a:minorFont>
         <a:latin typeface="Helvetica Neue"/>
         <a:ea typeface="Helvetica Neue"/>
         <a:cs typeface="Helvetica Neue"/>
-      </a:majorFont>
-      <a:minorFont>
-        <a:latin typeface="Helvetica"/>
-        <a:ea typeface="Helvetica"/>
-        <a:cs typeface="Helvetica"/>
       </a:minorFont>
     </a:fontScheme>
     <a:fmtScheme name="Default">
@@ -5978,7 +6391,7 @@
     <a:spDef>
       <a:spPr>
         <a:solidFill>
-          <a:srgbClr val="FFFFFF"/>
+          <a:srgbClr val="FF0000"/>
         </a:solidFill>
         <a:ln w="25400" cap="flat">
           <a:solidFill>
@@ -6019,14 +6432,14 @@
               <a:noFill/>
             </a:ln>
             <a:solidFill>
-              <a:srgbClr val="FF0000"/>
+              <a:srgbClr val="FFFFFF"/>
             </a:solidFill>
             <a:effectLst/>
             <a:uFillTx/>
-            <a:latin typeface="Helvetica Light"/>
-            <a:ea typeface="Helvetica Light"/>
-            <a:cs typeface="Helvetica Light"/>
-            <a:sym typeface="Helvetica Light"/>
+            <a:latin typeface="+mj-lt"/>
+            <a:ea typeface="+mj-ea"/>
+            <a:cs typeface="+mj-cs"/>
+            <a:sym typeface="Helvetica"/>
           </a:defRPr>
         </a:defPPr>
         <a:lvl1pPr marL="0" marR="0" indent="0" algn="l" defTabSz="914400" rtl="0" fontAlgn="auto" latinLnBrk="1" hangingPunct="0">
@@ -6594,14 +7007,14 @@
               <a:noFill/>
             </a:ln>
             <a:solidFill>
-              <a:srgbClr val="FF0000"/>
+              <a:srgbClr val="FFFFFF"/>
             </a:solidFill>
             <a:effectLst/>
             <a:uFillTx/>
-            <a:latin typeface="Helvetica Light"/>
-            <a:ea typeface="Helvetica Light"/>
-            <a:cs typeface="Helvetica Light"/>
-            <a:sym typeface="Helvetica Light"/>
+            <a:latin typeface="+mj-lt"/>
+            <a:ea typeface="+mj-ea"/>
+            <a:cs typeface="+mj-cs"/>
+            <a:sym typeface="Helvetica"/>
           </a:defRPr>
         </a:defPPr>
         <a:lvl1pPr marL="0" marR="0" indent="0" algn="l" defTabSz="914400" rtl="0" fontAlgn="auto" latinLnBrk="1" hangingPunct="0">

</xml_diff>